<commit_message>
Update document and dealing with some warnings
</commit_message>
<xml_diff>
--- a/Indie Game Challenge/Assets/Document/開発資料.pptx
+++ b/Indie Game Challenge/Assets/Document/開発資料.pptx
@@ -5063,7 +5063,7 @@
         <p:spPr>
           <a:xfrm>
             <a:off x="537412" y="545432"/>
-            <a:ext cx="11341768" cy="2585323"/>
+            <a:ext cx="11341768" cy="3139321"/>
           </a:xfrm>
           <a:prstGeom prst="rect">
             <a:avLst/>
@@ -5098,7 +5098,7 @@
           <a:p>
             <a:r>
               <a:rPr lang="ja-JP" altLang="en-US" dirty="0"/>
-              <a:t>・気持ちいいアクション</a:t>
+              <a:t>・気持ちいいアクション＆スピード感</a:t>
             </a:r>
             <a:endParaRPr lang="en-US" altLang="ja-JP" dirty="0"/>
           </a:p>
@@ -5108,7 +5108,7 @@
           <a:p>
             <a:r>
               <a:rPr lang="ja-JP" altLang="en-US" dirty="0"/>
-              <a:t>・シンプルで分かりやすいシステム</a:t>
+              <a:t>・シンプルで分かりやすいゲーム性</a:t>
             </a:r>
             <a:endParaRPr lang="en-US" altLang="ja-JP" dirty="0"/>
           </a:p>
@@ -5122,6 +5122,24 @@
             </a:r>
             <a:endParaRPr lang="en-US" altLang="ja-JP" dirty="0"/>
           </a:p>
+          <a:p>
+            <a:endParaRPr lang="en-US" altLang="ja-JP" dirty="0"/>
+          </a:p>
+          <a:p>
+            <a:r>
+              <a:rPr lang="ja-JP" altLang="en-US" dirty="0"/>
+              <a:t>・かわいいキャラクター、神</a:t>
+            </a:r>
+            <a:r>
+              <a:rPr lang="en-US" altLang="ja-JP" dirty="0"/>
+              <a:t>BGM</a:t>
+            </a:r>
+            <a:r>
+              <a:rPr lang="ja-JP" altLang="en-US" dirty="0"/>
+              <a:t>、ハマる世界観とかは正直無理だから諦めている</a:t>
+            </a:r>
+            <a:endParaRPr lang="en-US" altLang="ja-JP" dirty="0"/>
+          </a:p>
         </p:txBody>
       </p:sp>
       <p:sp>
@@ -5138,8 +5156,8 @@
         </p:nvSpPr>
         <p:spPr>
           <a:xfrm>
-            <a:off x="3695343" y="179615"/>
-            <a:ext cx="4801314" cy="276999"/>
+            <a:off x="699594" y="268433"/>
+            <a:ext cx="3724096" cy="276999"/>
           </a:xfrm>
           <a:prstGeom prst="rect">
             <a:avLst/>
@@ -5166,7 +5184,7 @@
                   <a:srgbClr val="FF0000"/>
                 </a:solidFill>
               </a:rPr>
-              <a:t>ここをちゃんと考えて決めないとゲーム制作が難航すると思う</a:t>
+              <a:t>ここを探究していけば多分いい物が作れると思う</a:t>
             </a:r>
           </a:p>
         </p:txBody>
@@ -6698,9 +6716,53 @@
           <a:p>
             <a:r>
               <a:rPr kumimoji="1" lang="ja-JP" altLang="en-US" dirty="0"/>
-              <a:t>ローグライクダンジョンでコインを集める</a:t>
+              <a:t>・ローグライクダンジョンでコインを集める</a:t>
             </a:r>
             <a:endParaRPr kumimoji="1" lang="en-US" altLang="ja-JP" dirty="0"/>
+          </a:p>
+        </p:txBody>
+      </p:sp>
+      <p:sp>
+        <p:nvSpPr>
+          <p:cNvPr id="2" name="テキスト ボックス 1">
+            <a:extLst>
+              <a:ext uri="{FF2B5EF4-FFF2-40B4-BE49-F238E27FC236}">
+                <a16:creationId xmlns:a16="http://schemas.microsoft.com/office/drawing/2014/main" id="{9AF8620B-32F3-F25E-3F16-CAEB7823A3D0}"/>
+              </a:ext>
+            </a:extLst>
+          </p:cNvPr>
+          <p:cNvSpPr txBox="1"/>
+          <p:nvPr/>
+        </p:nvSpPr>
+        <p:spPr>
+          <a:xfrm>
+            <a:off x="6030686" y="6463041"/>
+            <a:ext cx="3383280" cy="276999"/>
+          </a:xfrm>
+          <a:prstGeom prst="rect">
+            <a:avLst/>
+          </a:prstGeom>
+          <a:noFill/>
+        </p:spPr>
+        <p:txBody>
+          <a:bodyPr wrap="square" rtlCol="0">
+            <a:spAutoFit/>
+          </a:bodyPr>
+          <a:lstStyle/>
+          <a:p>
+            <a:r>
+              <a:rPr kumimoji="1" lang="ja-JP" altLang="en-US" sz="1200" dirty="0"/>
+              <a:t>→　ダンジョンクリア時間は</a:t>
+            </a:r>
+            <a:r>
+              <a:rPr kumimoji="1" lang="en-US" altLang="ja-JP" sz="1200" dirty="0"/>
+              <a:t>1</a:t>
+            </a:r>
+            <a:r>
+              <a:rPr kumimoji="1" lang="ja-JP" altLang="en-US" sz="1200" dirty="0"/>
+              <a:t>分ぐらいを想定</a:t>
+            </a:r>
+            <a:endParaRPr kumimoji="1" lang="en-US" altLang="ja-JP" sz="1200" dirty="0"/>
           </a:p>
         </p:txBody>
       </p:sp>

</xml_diff>

<commit_message>
Add jump action and fall action
</commit_message>
<xml_diff>
--- a/Indie Game Challenge/Assets/Document/開発資料.pptx
+++ b/Indie Game Challenge/Assets/Document/開発資料.pptx
@@ -280,7 +280,7 @@
           <a:p>
             <a:fld id="{6FD30967-73D8-4BC5-8AAD-C817C2886B90}" type="datetimeFigureOut">
               <a:rPr kumimoji="1" lang="ja-JP" altLang="en-US" smtClean="0"/>
-              <a:t>2023/6/24</a:t>
+              <a:t>2023/6/28</a:t>
             </a:fld>
             <a:endParaRPr kumimoji="1" lang="ja-JP" altLang="en-US"/>
           </a:p>
@@ -510,7 +510,7 @@
           <a:p>
             <a:fld id="{6FD30967-73D8-4BC5-8AAD-C817C2886B90}" type="datetimeFigureOut">
               <a:rPr kumimoji="1" lang="ja-JP" altLang="en-US" smtClean="0"/>
-              <a:t>2023/6/24</a:t>
+              <a:t>2023/6/28</a:t>
             </a:fld>
             <a:endParaRPr kumimoji="1" lang="ja-JP" altLang="en-US"/>
           </a:p>
@@ -750,7 +750,7 @@
           <a:p>
             <a:fld id="{6FD30967-73D8-4BC5-8AAD-C817C2886B90}" type="datetimeFigureOut">
               <a:rPr kumimoji="1" lang="ja-JP" altLang="en-US" smtClean="0"/>
-              <a:t>2023/6/24</a:t>
+              <a:t>2023/6/28</a:t>
             </a:fld>
             <a:endParaRPr kumimoji="1" lang="ja-JP" altLang="en-US"/>
           </a:p>
@@ -980,7 +980,7 @@
           <a:p>
             <a:fld id="{6FD30967-73D8-4BC5-8AAD-C817C2886B90}" type="datetimeFigureOut">
               <a:rPr kumimoji="1" lang="ja-JP" altLang="en-US" smtClean="0"/>
-              <a:t>2023/6/24</a:t>
+              <a:t>2023/6/28</a:t>
             </a:fld>
             <a:endParaRPr kumimoji="1" lang="ja-JP" altLang="en-US"/>
           </a:p>
@@ -1255,7 +1255,7 @@
           <a:p>
             <a:fld id="{6FD30967-73D8-4BC5-8AAD-C817C2886B90}" type="datetimeFigureOut">
               <a:rPr kumimoji="1" lang="ja-JP" altLang="en-US" smtClean="0"/>
-              <a:t>2023/6/24</a:t>
+              <a:t>2023/6/28</a:t>
             </a:fld>
             <a:endParaRPr kumimoji="1" lang="ja-JP" altLang="en-US"/>
           </a:p>
@@ -1584,7 +1584,7 @@
           <a:p>
             <a:fld id="{6FD30967-73D8-4BC5-8AAD-C817C2886B90}" type="datetimeFigureOut">
               <a:rPr kumimoji="1" lang="ja-JP" altLang="en-US" smtClean="0"/>
-              <a:t>2023/6/24</a:t>
+              <a:t>2023/6/28</a:t>
             </a:fld>
             <a:endParaRPr kumimoji="1" lang="ja-JP" altLang="en-US"/>
           </a:p>
@@ -2060,7 +2060,7 @@
           <a:p>
             <a:fld id="{6FD30967-73D8-4BC5-8AAD-C817C2886B90}" type="datetimeFigureOut">
               <a:rPr kumimoji="1" lang="ja-JP" altLang="en-US" smtClean="0"/>
-              <a:t>2023/6/24</a:t>
+              <a:t>2023/6/28</a:t>
             </a:fld>
             <a:endParaRPr kumimoji="1" lang="ja-JP" altLang="en-US"/>
           </a:p>
@@ -2201,7 +2201,7 @@
           <a:p>
             <a:fld id="{6FD30967-73D8-4BC5-8AAD-C817C2886B90}" type="datetimeFigureOut">
               <a:rPr kumimoji="1" lang="ja-JP" altLang="en-US" smtClean="0"/>
-              <a:t>2023/6/24</a:t>
+              <a:t>2023/6/28</a:t>
             </a:fld>
             <a:endParaRPr kumimoji="1" lang="ja-JP" altLang="en-US"/>
           </a:p>
@@ -2314,7 +2314,7 @@
           <a:p>
             <a:fld id="{6FD30967-73D8-4BC5-8AAD-C817C2886B90}" type="datetimeFigureOut">
               <a:rPr kumimoji="1" lang="ja-JP" altLang="en-US" smtClean="0"/>
-              <a:t>2023/6/24</a:t>
+              <a:t>2023/6/28</a:t>
             </a:fld>
             <a:endParaRPr kumimoji="1" lang="ja-JP" altLang="en-US"/>
           </a:p>
@@ -2657,7 +2657,7 @@
           <a:p>
             <a:fld id="{6FD30967-73D8-4BC5-8AAD-C817C2886B90}" type="datetimeFigureOut">
               <a:rPr kumimoji="1" lang="ja-JP" altLang="en-US" smtClean="0"/>
-              <a:t>2023/6/24</a:t>
+              <a:t>2023/6/28</a:t>
             </a:fld>
             <a:endParaRPr kumimoji="1" lang="ja-JP" altLang="en-US"/>
           </a:p>
@@ -2945,7 +2945,7 @@
           <a:p>
             <a:fld id="{6FD30967-73D8-4BC5-8AAD-C817C2886B90}" type="datetimeFigureOut">
               <a:rPr kumimoji="1" lang="ja-JP" altLang="en-US" smtClean="0"/>
-              <a:t>2023/6/24</a:t>
+              <a:t>2023/6/28</a:t>
             </a:fld>
             <a:endParaRPr kumimoji="1" lang="ja-JP" altLang="en-US"/>
           </a:p>
@@ -3218,7 +3218,7 @@
           <a:p>
             <a:fld id="{6FD30967-73D8-4BC5-8AAD-C817C2886B90}" type="datetimeFigureOut">
               <a:rPr kumimoji="1" lang="ja-JP" altLang="en-US" smtClean="0"/>
-              <a:t>2023/6/24</a:t>
+              <a:t>2023/6/28</a:t>
             </a:fld>
             <a:endParaRPr kumimoji="1" lang="ja-JP" altLang="en-US"/>
           </a:p>
@@ -4058,7 +4058,7 @@
         <p:spPr>
           <a:xfrm>
             <a:off x="264696" y="890157"/>
-            <a:ext cx="11527254" cy="1354217"/>
+            <a:ext cx="11527254" cy="1631216"/>
           </a:xfrm>
           <a:prstGeom prst="rect">
             <a:avLst/>
@@ -4087,7 +4087,11 @@
             </a:r>
             <a:r>
               <a:rPr kumimoji="1" lang="ja-JP" altLang="en-US" dirty="0"/>
-              <a:t>主人公の後ろに謎の影が現れて続きが気になるような要素を入れる</a:t>
+              <a:t>主人公の後ろに謎の影が現れて続きが気になるような要素を入れる（ライバル要素とか入れてそいつと戦うボス戦とか入れる？　→　エンディングでまた登場させてしつこさ</a:t>
+            </a:r>
+            <a:r>
+              <a:rPr kumimoji="1" lang="ja-JP" altLang="en-US"/>
+              <a:t>アピールとか）</a:t>
             </a:r>
             <a:endParaRPr kumimoji="1" lang="en-US" altLang="ja-JP" dirty="0"/>
           </a:p>

</xml_diff>

<commit_message>
Add test skill to key 1 and player combat to key 2
</commit_message>
<xml_diff>
--- a/Indie Game Challenge/Assets/Document/開発資料.pptx
+++ b/Indie Game Challenge/Assets/Document/開発資料.pptx
@@ -280,7 +280,7 @@
           <a:p>
             <a:fld id="{6FD30967-73D8-4BC5-8AAD-C817C2886B90}" type="datetimeFigureOut">
               <a:rPr kumimoji="1" lang="ja-JP" altLang="en-US" smtClean="0"/>
-              <a:t>2023/6/28</a:t>
+              <a:t>2023/7/5</a:t>
             </a:fld>
             <a:endParaRPr kumimoji="1" lang="ja-JP" altLang="en-US"/>
           </a:p>
@@ -510,7 +510,7 @@
           <a:p>
             <a:fld id="{6FD30967-73D8-4BC5-8AAD-C817C2886B90}" type="datetimeFigureOut">
               <a:rPr kumimoji="1" lang="ja-JP" altLang="en-US" smtClean="0"/>
-              <a:t>2023/6/28</a:t>
+              <a:t>2023/7/5</a:t>
             </a:fld>
             <a:endParaRPr kumimoji="1" lang="ja-JP" altLang="en-US"/>
           </a:p>
@@ -750,7 +750,7 @@
           <a:p>
             <a:fld id="{6FD30967-73D8-4BC5-8AAD-C817C2886B90}" type="datetimeFigureOut">
               <a:rPr kumimoji="1" lang="ja-JP" altLang="en-US" smtClean="0"/>
-              <a:t>2023/6/28</a:t>
+              <a:t>2023/7/5</a:t>
             </a:fld>
             <a:endParaRPr kumimoji="1" lang="ja-JP" altLang="en-US"/>
           </a:p>
@@ -980,7 +980,7 @@
           <a:p>
             <a:fld id="{6FD30967-73D8-4BC5-8AAD-C817C2886B90}" type="datetimeFigureOut">
               <a:rPr kumimoji="1" lang="ja-JP" altLang="en-US" smtClean="0"/>
-              <a:t>2023/6/28</a:t>
+              <a:t>2023/7/5</a:t>
             </a:fld>
             <a:endParaRPr kumimoji="1" lang="ja-JP" altLang="en-US"/>
           </a:p>
@@ -1255,7 +1255,7 @@
           <a:p>
             <a:fld id="{6FD30967-73D8-4BC5-8AAD-C817C2886B90}" type="datetimeFigureOut">
               <a:rPr kumimoji="1" lang="ja-JP" altLang="en-US" smtClean="0"/>
-              <a:t>2023/6/28</a:t>
+              <a:t>2023/7/5</a:t>
             </a:fld>
             <a:endParaRPr kumimoji="1" lang="ja-JP" altLang="en-US"/>
           </a:p>
@@ -1584,7 +1584,7 @@
           <a:p>
             <a:fld id="{6FD30967-73D8-4BC5-8AAD-C817C2886B90}" type="datetimeFigureOut">
               <a:rPr kumimoji="1" lang="ja-JP" altLang="en-US" smtClean="0"/>
-              <a:t>2023/6/28</a:t>
+              <a:t>2023/7/5</a:t>
             </a:fld>
             <a:endParaRPr kumimoji="1" lang="ja-JP" altLang="en-US"/>
           </a:p>
@@ -2060,7 +2060,7 @@
           <a:p>
             <a:fld id="{6FD30967-73D8-4BC5-8AAD-C817C2886B90}" type="datetimeFigureOut">
               <a:rPr kumimoji="1" lang="ja-JP" altLang="en-US" smtClean="0"/>
-              <a:t>2023/6/28</a:t>
+              <a:t>2023/7/5</a:t>
             </a:fld>
             <a:endParaRPr kumimoji="1" lang="ja-JP" altLang="en-US"/>
           </a:p>
@@ -2201,7 +2201,7 @@
           <a:p>
             <a:fld id="{6FD30967-73D8-4BC5-8AAD-C817C2886B90}" type="datetimeFigureOut">
               <a:rPr kumimoji="1" lang="ja-JP" altLang="en-US" smtClean="0"/>
-              <a:t>2023/6/28</a:t>
+              <a:t>2023/7/5</a:t>
             </a:fld>
             <a:endParaRPr kumimoji="1" lang="ja-JP" altLang="en-US"/>
           </a:p>
@@ -2314,7 +2314,7 @@
           <a:p>
             <a:fld id="{6FD30967-73D8-4BC5-8AAD-C817C2886B90}" type="datetimeFigureOut">
               <a:rPr kumimoji="1" lang="ja-JP" altLang="en-US" smtClean="0"/>
-              <a:t>2023/6/28</a:t>
+              <a:t>2023/7/5</a:t>
             </a:fld>
             <a:endParaRPr kumimoji="1" lang="ja-JP" altLang="en-US"/>
           </a:p>
@@ -2657,7 +2657,7 @@
           <a:p>
             <a:fld id="{6FD30967-73D8-4BC5-8AAD-C817C2886B90}" type="datetimeFigureOut">
               <a:rPr kumimoji="1" lang="ja-JP" altLang="en-US" smtClean="0"/>
-              <a:t>2023/6/28</a:t>
+              <a:t>2023/7/5</a:t>
             </a:fld>
             <a:endParaRPr kumimoji="1" lang="ja-JP" altLang="en-US"/>
           </a:p>
@@ -2945,7 +2945,7 @@
           <a:p>
             <a:fld id="{6FD30967-73D8-4BC5-8AAD-C817C2886B90}" type="datetimeFigureOut">
               <a:rPr kumimoji="1" lang="ja-JP" altLang="en-US" smtClean="0"/>
-              <a:t>2023/6/28</a:t>
+              <a:t>2023/7/5</a:t>
             </a:fld>
             <a:endParaRPr kumimoji="1" lang="ja-JP" altLang="en-US"/>
           </a:p>
@@ -3218,7 +3218,7 @@
           <a:p>
             <a:fld id="{6FD30967-73D8-4BC5-8AAD-C817C2886B90}" type="datetimeFigureOut">
               <a:rPr kumimoji="1" lang="ja-JP" altLang="en-US" smtClean="0"/>
-              <a:t>2023/6/28</a:t>
+              <a:t>2023/7/5</a:t>
             </a:fld>
             <a:endParaRPr kumimoji="1" lang="ja-JP" altLang="en-US"/>
           </a:p>
@@ -5174,6 +5174,50 @@
           </p:txBody>
         </p:sp>
       </p:grpSp>
+      <p:sp>
+        <p:nvSpPr>
+          <p:cNvPr id="2" name="テキスト ボックス 1">
+            <a:extLst>
+              <a:ext uri="{FF2B5EF4-FFF2-40B4-BE49-F238E27FC236}">
+                <a16:creationId xmlns:a16="http://schemas.microsoft.com/office/drawing/2014/main" id="{521B8ECA-396D-5221-972C-8B18C0DF2819}"/>
+              </a:ext>
+            </a:extLst>
+          </p:cNvPr>
+          <p:cNvSpPr txBox="1"/>
+          <p:nvPr/>
+        </p:nvSpPr>
+        <p:spPr>
+          <a:xfrm>
+            <a:off x="4852736" y="6051237"/>
+            <a:ext cx="5032147" cy="369332"/>
+          </a:xfrm>
+          <a:prstGeom prst="rect">
+            <a:avLst/>
+          </a:prstGeom>
+          <a:noFill/>
+        </p:spPr>
+        <p:txBody>
+          <a:bodyPr wrap="none" rtlCol="0">
+            <a:spAutoFit/>
+          </a:bodyPr>
+          <a:lstStyle/>
+          <a:p>
+            <a:r>
+              <a:rPr lang="ja-JP" altLang="en-US" dirty="0">
+                <a:solidFill>
+                  <a:srgbClr val="FF0000"/>
+                </a:solidFill>
+              </a:rPr>
+              <a:t>ダンテの「神曲」の様に詩、歌の様な文にする</a:t>
+            </a:r>
+            <a:endParaRPr kumimoji="1" lang="ja-JP" altLang="en-US" dirty="0">
+              <a:solidFill>
+                <a:srgbClr val="FF0000"/>
+              </a:solidFill>
+            </a:endParaRPr>
+          </a:p>
+        </p:txBody>
+      </p:sp>
     </p:spTree>
     <p:extLst>
       <p:ext uri="{BB962C8B-B14F-4D97-AF65-F5344CB8AC3E}">

</xml_diff>